<commit_message>
Dodane odredice za Git
</commit_message>
<xml_diff>
--- a/PPT/AngularJS-06-Ponedeljak-Jun-15.pptx
+++ b/PPT/AngularJS-06-Ponedeljak-Jun-15.pptx
@@ -5,7 +5,7 @@
     <p:sldMasterId id="2147483648" r:id="rId3"/>
   </p:sldMasterIdLst>
   <p:notesMasterIdLst>
-    <p:notesMasterId r:id="rId14"/>
+    <p:notesMasterId r:id="rId15"/>
   </p:notesMasterIdLst>
   <p:sldIdLst>
     <p:sldId id="256" r:id="rId4"/>
@@ -17,7 +17,8 @@
     <p:sldId id="284" r:id="rId10"/>
     <p:sldId id="285" r:id="rId11"/>
     <p:sldId id="286" r:id="rId12"/>
-    <p:sldId id="279" r:id="rId13"/>
+    <p:sldId id="287" r:id="rId13"/>
+    <p:sldId id="279" r:id="rId14"/>
   </p:sldIdLst>
   <p:sldSz cx="12192000" cy="6858000"/>
   <p:notesSz cx="6858000" cy="9144000"/>
@@ -206,7 +207,7 @@
           <a:p>
             <a:fld id="{5F0EABF2-0DA8-4D73-92C5-4380F4D28A7C}" type="datetimeFigureOut">
               <a:rPr lang="en-US" smtClean="0"/>
-              <a:t>6/9/2015</a:t>
+              <a:t>6/14/2015</a:t>
             </a:fld>
             <a:endParaRPr lang="en-US"/>
           </a:p>
@@ -3638,6 +3639,208 @@
           <a:p>
             <a:r>
               <a:rPr lang="en-US" dirty="0" err="1" smtClean="0"/>
+              <a:t>Git</a:t>
+            </a:r>
+            <a:r>
+              <a:rPr lang="en-US" dirty="0" smtClean="0"/>
+              <a:t>/GitHub – par </a:t>
+            </a:r>
+            <a:r>
+              <a:rPr lang="en-US" dirty="0" err="1" smtClean="0"/>
+              <a:t>uvodnih</a:t>
+            </a:r>
+            <a:r>
+              <a:rPr lang="en-US" dirty="0" smtClean="0"/>
+              <a:t> re</a:t>
+            </a:r>
+            <a:r>
+              <a:rPr lang="sr-Latn-RS" dirty="0" err="1" smtClean="0"/>
+              <a:t>či</a:t>
+            </a:r>
+            <a:endParaRPr lang="en-US" dirty="0"/>
+          </a:p>
+        </p:txBody>
+      </p:sp>
+      <p:sp>
+        <p:nvSpPr>
+          <p:cNvPr id="3" name="Content Placeholder 2"/>
+          <p:cNvSpPr>
+            <a:spLocks noGrp="1"/>
+          </p:cNvSpPr>
+          <p:nvPr>
+            <p:ph idx="1"/>
+          </p:nvPr>
+        </p:nvSpPr>
+        <p:spPr/>
+        <p:txBody>
+          <a:bodyPr/>
+          <a:lstStyle/>
+          <a:p>
+            <a:r>
+              <a:rPr lang="sr-Latn-RS" dirty="0" smtClean="0"/>
+              <a:t>Alati za čuvanje/deljenje </a:t>
+            </a:r>
+            <a:r>
+              <a:rPr lang="sr-Latn-RS" dirty="0" err="1" smtClean="0"/>
+              <a:t>source</a:t>
+            </a:r>
+            <a:r>
+              <a:rPr lang="sr-Latn-RS" dirty="0" smtClean="0"/>
+              <a:t> </a:t>
+            </a:r>
+            <a:r>
+              <a:rPr lang="sr-Latn-RS" dirty="0" err="1" smtClean="0"/>
+              <a:t>coda</a:t>
+            </a:r>
+            <a:endParaRPr lang="sr-Latn-RS" dirty="0" smtClean="0"/>
+          </a:p>
+          <a:p>
+            <a:r>
+              <a:rPr lang="sr-Latn-RS" dirty="0" err="1" smtClean="0"/>
+              <a:t>Centalizovani</a:t>
+            </a:r>
+            <a:endParaRPr lang="sr-Latn-RS" dirty="0" smtClean="0"/>
+          </a:p>
+          <a:p>
+            <a:r>
+              <a:rPr lang="sr-Latn-RS" dirty="0" smtClean="0"/>
+              <a:t>Distribuirani</a:t>
+            </a:r>
+          </a:p>
+          <a:p>
+            <a:r>
+              <a:rPr lang="sr-Latn-RS" dirty="0" smtClean="0"/>
+              <a:t>Git</a:t>
+            </a:r>
+          </a:p>
+          <a:p>
+            <a:r>
+              <a:rPr lang="sr-Latn-RS" dirty="0" smtClean="0"/>
+              <a:t>Materijal sa kursa se nalazi na adresi</a:t>
+            </a:r>
+          </a:p>
+          <a:p>
+            <a:pPr lvl="1"/>
+            <a:r>
+              <a:rPr lang="en-US" dirty="0">
+                <a:hlinkClick r:id="rId2"/>
+              </a:rPr>
+              <a:t>https://</a:t>
+            </a:r>
+            <a:r>
+              <a:rPr lang="en-US" dirty="0" smtClean="0">
+                <a:hlinkClick r:id="rId2"/>
+              </a:rPr>
+              <a:t>github.com/rostojic/AngularJS-Kurs</a:t>
+            </a:r>
+            <a:r>
+              <a:rPr lang="sr-Latn-RS" smtClean="0"/>
+              <a:t> </a:t>
+            </a:r>
+            <a:endParaRPr lang="en-US" dirty="0"/>
+          </a:p>
+        </p:txBody>
+      </p:sp>
+      <p:sp>
+        <p:nvSpPr>
+          <p:cNvPr id="4" name="Footer Placeholder 3"/>
+          <p:cNvSpPr>
+            <a:spLocks noGrp="1"/>
+          </p:cNvSpPr>
+          <p:nvPr>
+            <p:ph type="ftr" sz="quarter" idx="11"/>
+          </p:nvPr>
+        </p:nvSpPr>
+        <p:spPr/>
+        <p:txBody>
+          <a:bodyPr/>
+          <a:lstStyle/>
+          <a:p>
+            <a:r>
+              <a:rPr lang="en-US" smtClean="0"/>
+              <a:t>AngularJS </a:t>
+            </a:r>
+            <a:endParaRPr lang="en-US"/>
+          </a:p>
+        </p:txBody>
+      </p:sp>
+      <p:sp>
+        <p:nvSpPr>
+          <p:cNvPr id="5" name="Slide Number Placeholder 4"/>
+          <p:cNvSpPr>
+            <a:spLocks noGrp="1"/>
+          </p:cNvSpPr>
+          <p:nvPr>
+            <p:ph type="sldNum" sz="quarter" idx="12"/>
+          </p:nvPr>
+        </p:nvSpPr>
+        <p:spPr/>
+        <p:txBody>
+          <a:bodyPr/>
+          <a:lstStyle/>
+          <a:p>
+            <a:fld id="{7812BE5C-010D-46E5-838C-00DE8D05F49C}" type="slidenum">
+              <a:rPr lang="en-US" smtClean="0"/>
+              <a:t>10</a:t>
+            </a:fld>
+            <a:endParaRPr lang="en-US"/>
+          </a:p>
+        </p:txBody>
+      </p:sp>
+    </p:spTree>
+    <p:extLst>
+      <p:ext uri="{BB962C8B-B14F-4D97-AF65-F5344CB8AC3E}">
+        <p14:creationId xmlns:p14="http://schemas.microsoft.com/office/powerpoint/2010/main" val="77406466"/>
+      </p:ext>
+    </p:extLst>
+  </p:cSld>
+  <p:clrMapOvr>
+    <a:masterClrMapping/>
+  </p:clrMapOvr>
+  <p:timing>
+    <p:tnLst>
+      <p:par>
+        <p:cTn id="1" dur="indefinite" restart="never" nodeType="tmRoot"/>
+      </p:par>
+    </p:tnLst>
+  </p:timing>
+</p:sld>
+</file>
+
+<file path=ppt/slides/slide11.xml><?xml version="1.0" encoding="utf-8"?>
+<p:sld xmlns:a="http://schemas.openxmlformats.org/drawingml/2006/main" xmlns:r="http://schemas.openxmlformats.org/officeDocument/2006/relationships" xmlns:p="http://schemas.openxmlformats.org/presentationml/2006/main">
+  <p:cSld>
+    <p:spTree>
+      <p:nvGrpSpPr>
+        <p:cNvPr id="1" name=""/>
+        <p:cNvGrpSpPr/>
+        <p:nvPr/>
+      </p:nvGrpSpPr>
+      <p:grpSpPr>
+        <a:xfrm>
+          <a:off x="0" y="0"/>
+          <a:ext cx="0" cy="0"/>
+          <a:chOff x="0" y="0"/>
+          <a:chExt cx="0" cy="0"/>
+        </a:xfrm>
+      </p:grpSpPr>
+      <p:sp>
+        <p:nvSpPr>
+          <p:cNvPr id="2" name="Title 1"/>
+          <p:cNvSpPr>
+            <a:spLocks noGrp="1"/>
+          </p:cNvSpPr>
+          <p:nvPr>
+            <p:ph type="title"/>
+          </p:nvPr>
+        </p:nvSpPr>
+        <p:spPr/>
+        <p:txBody>
+          <a:bodyPr/>
+          <a:lstStyle/>
+          <a:p>
+            <a:r>
+              <a:rPr lang="en-US" dirty="0" err="1" smtClean="0"/>
               <a:t>Hvala</a:t>
             </a:r>
             <a:r>
@@ -3757,7 +3960,7 @@
           <a:p>
             <a:fld id="{7812BE5C-010D-46E5-838C-00DE8D05F49C}" type="slidenum">
               <a:rPr lang="en-US" smtClean="0"/>
-              <a:t>10</a:t>
+              <a:t>11</a:t>
             </a:fld>
             <a:endParaRPr lang="en-US" dirty="0"/>
           </a:p>
@@ -6318,18 +6521,18 @@
 
 <file path=customXml/item1.xml><?xml version="1.0" encoding="utf-8"?>
 <Control xmlns="http://schemas.microsoft.com/VisualStudio/2011/storyboarding/control">
-  <Id Name="b7f90647-533a-49f3-ae4a-edfa85843d43" Revision="1" Stencil="System.MyShapes" StencilVersion="1.0"/>
+  <Id Name="System.Storyboarding.Common.Button" Revision="1" Stencil="System.Storyboarding.Common" StencilVersion="0.1"/>
 </Control>
 </file>
 
 <file path=customXml/item2.xml><?xml version="1.0" encoding="utf-8"?>
 <Control xmlns="http://schemas.microsoft.com/VisualStudio/2011/storyboarding/control">
-  <Id Name="System.Storyboarding.Common.Button" Revision="1" Stencil="System.Storyboarding.Common" StencilVersion="0.1"/>
+  <Id Name="b7f90647-533a-49f3-ae4a-edfa85843d43" Revision="1" Stencil="System.MyShapes" StencilVersion="1.0"/>
 </Control>
 </file>
 
 <file path=customXml/itemProps1.xml><?xml version="1.0" encoding="utf-8"?>
-<ds:datastoreItem xmlns:ds="http://schemas.openxmlformats.org/officeDocument/2006/customXml" ds:itemID="{B22BC64D-BC56-417B-9820-1A8C2DE51FAC}">
+<ds:datastoreItem xmlns:ds="http://schemas.openxmlformats.org/officeDocument/2006/customXml" ds:itemID="{04C93224-3620-470A-A0D8-869FB4AB9E88}">
   <ds:schemaRefs>
     <ds:schemaRef ds:uri="http://schemas.microsoft.com/VisualStudio/2011/storyboarding/control"/>
   </ds:schemaRefs>
@@ -6337,7 +6540,7 @@
 </file>
 
 <file path=customXml/itemProps2.xml><?xml version="1.0" encoding="utf-8"?>
-<ds:datastoreItem xmlns:ds="http://schemas.openxmlformats.org/officeDocument/2006/customXml" ds:itemID="{04C93224-3620-470A-A0D8-869FB4AB9E88}">
+<ds:datastoreItem xmlns:ds="http://schemas.openxmlformats.org/officeDocument/2006/customXml" ds:itemID="{B22BC64D-BC56-417B-9820-1A8C2DE51FAC}">
   <ds:schemaRefs>
     <ds:schemaRef ds:uri="http://schemas.microsoft.com/VisualStudio/2011/storyboarding/control"/>
   </ds:schemaRefs>

</xml_diff>